<commit_message>
Added last Slide in ppt PResentation
</commit_message>
<xml_diff>
--- a/docs/Presentation_TableauStory/NYC Yellow Taxi Tipping Presentation Intro and conclusion.pptx
+++ b/docs/Presentation_TableauStory/NYC Yellow Taxi Tipping Presentation Intro and conclusion.pptx
@@ -5,10 +5,10 @@
     <p:sldMasterId id="2147483648" r:id="rId4"/>
   </p:sldMasterIdLst>
   <p:notesMasterIdLst>
-    <p:notesMasterId r:id="rId13"/>
+    <p:notesMasterId r:id="rId14"/>
   </p:notesMasterIdLst>
   <p:handoutMasterIdLst>
-    <p:handoutMasterId r:id="rId14"/>
+    <p:handoutMasterId r:id="rId15"/>
   </p:handoutMasterIdLst>
   <p:sldIdLst>
     <p:sldId id="322" r:id="rId5"/>
@@ -19,6 +19,7 @@
     <p:sldId id="328" r:id="rId10"/>
     <p:sldId id="329" r:id="rId11"/>
     <p:sldId id="327" r:id="rId12"/>
+    <p:sldId id="330" r:id="rId13"/>
   </p:sldIdLst>
   <p:sldSz cx="12192000" cy="6858000"/>
   <p:notesSz cx="6858000" cy="9144000"/>
@@ -230,7 +231,7 @@
             <a:pPr rtl="0"/>
             <a:fld id="{B045831F-6AD1-4DED-BF09-35BFE3A3C66F}" type="datetime1">
               <a:rPr lang="de-DE" smtClean="0"/>
-              <a:t>23.02.2026</a:t>
+              <a:t>24.02.2026</a:t>
             </a:fld>
             <a:endParaRPr lang="de-DE" dirty="0"/>
           </a:p>
@@ -411,7 +412,7 @@
             <a:fld id="{4EAF0040-DFA1-4580-86F0-5CFB9E4596B0}" type="datetime1">
               <a:rPr lang="de-DE" smtClean="0"/>
               <a:pPr/>
-              <a:t>23.02.2026</a:t>
+              <a:t>24.02.2026</a:t>
             </a:fld>
             <a:endParaRPr lang="de-DE" dirty="0"/>
           </a:p>
@@ -1432,6 +1433,100 @@
     <p:extLst>
       <p:ext uri="{BB962C8B-B14F-4D97-AF65-F5344CB8AC3E}">
         <p14:creationId xmlns:p14="http://schemas.microsoft.com/office/powerpoint/2010/main" val="3063067808"/>
+      </p:ext>
+    </p:extLst>
+  </p:cSld>
+  <p:clrMapOvr>
+    <a:masterClrMapping/>
+  </p:clrMapOvr>
+</p:notes>
+</file>
+
+<file path=ppt/notesSlides/notesSlide9.xml><?xml version="1.0" encoding="utf-8"?>
+<p:notes xmlns:a="http://schemas.openxmlformats.org/drawingml/2006/main" xmlns:r="http://schemas.openxmlformats.org/officeDocument/2006/relationships" xmlns:p="http://schemas.openxmlformats.org/presentationml/2006/main">
+  <p:cSld>
+    <p:spTree>
+      <p:nvGrpSpPr>
+        <p:cNvPr id="1" name=""/>
+        <p:cNvGrpSpPr/>
+        <p:nvPr/>
+      </p:nvGrpSpPr>
+      <p:grpSpPr>
+        <a:xfrm>
+          <a:off x="0" y="0"/>
+          <a:ext cx="0" cy="0"/>
+          <a:chOff x="0" y="0"/>
+          <a:chExt cx="0" cy="0"/>
+        </a:xfrm>
+      </p:grpSpPr>
+      <p:sp>
+        <p:nvSpPr>
+          <p:cNvPr id="2" name="Folienbildplatzhalter 1"/>
+          <p:cNvSpPr>
+            <a:spLocks noGrp="1" noRot="1" noChangeAspect="1"/>
+          </p:cNvSpPr>
+          <p:nvPr>
+            <p:ph type="sldImg"/>
+          </p:nvPr>
+        </p:nvSpPr>
+        <p:spPr/>
+      </p:sp>
+      <p:sp>
+        <p:nvSpPr>
+          <p:cNvPr id="3" name="Notizenplatzhalter 2"/>
+          <p:cNvSpPr>
+            <a:spLocks noGrp="1"/>
+          </p:cNvSpPr>
+          <p:nvPr>
+            <p:ph type="body" idx="1"/>
+          </p:nvPr>
+        </p:nvSpPr>
+        <p:spPr/>
+        <p:txBody>
+          <a:bodyPr rtlCol="0"/>
+          <a:lstStyle>
+            <a:defPPr>
+              <a:defRPr lang="de-DE"/>
+            </a:defPPr>
+          </a:lstStyle>
+          <a:p>
+            <a:pPr rtl="0"/>
+            <a:endParaRPr lang="de-DE" dirty="0"/>
+          </a:p>
+        </p:txBody>
+      </p:sp>
+      <p:sp>
+        <p:nvSpPr>
+          <p:cNvPr id="4" name="Foliennummernplatzhalter 3"/>
+          <p:cNvSpPr>
+            <a:spLocks noGrp="1"/>
+          </p:cNvSpPr>
+          <p:nvPr>
+            <p:ph type="sldNum" sz="quarter" idx="5"/>
+          </p:nvPr>
+        </p:nvSpPr>
+        <p:spPr/>
+        <p:txBody>
+          <a:bodyPr rtlCol="0"/>
+          <a:lstStyle>
+            <a:defPPr>
+              <a:defRPr lang="de-DE"/>
+            </a:defPPr>
+          </a:lstStyle>
+          <a:p>
+            <a:pPr rtl="0"/>
+            <a:fld id="{C37D7554-D10C-4E29-B8E6-BB7111FA614F}" type="slidenum">
+              <a:rPr lang="de-DE" smtClean="0"/>
+              <a:t>9</a:t>
+            </a:fld>
+            <a:endParaRPr lang="de-DE" dirty="0"/>
+          </a:p>
+        </p:txBody>
+      </p:sp>
+    </p:spTree>
+    <p:extLst>
+      <p:ext uri="{BB962C8B-B14F-4D97-AF65-F5344CB8AC3E}">
+        <p14:creationId xmlns:p14="http://schemas.microsoft.com/office/powerpoint/2010/main" val="734063024"/>
       </p:ext>
     </p:extLst>
   </p:cSld>
@@ -6896,7 +6991,7 @@
           <a:p>
             <a:pPr rtl="0"/>
             <a:r>
-              <a:rPr lang="de-DE">
+              <a:rPr lang="de-DE" dirty="0">
                 <a:solidFill>
                   <a:schemeClr val="bg1"/>
                 </a:solidFill>
@@ -6905,13 +7000,6 @@
               </a:rPr>
               <a:t>NYC Yellow Taxi Tipping</a:t>
             </a:r>
-            <a:endParaRPr lang="de-DE" dirty="0">
-              <a:solidFill>
-                <a:schemeClr val="bg1"/>
-              </a:solidFill>
-              <a:latin typeface="Segoe UI Semibold" panose="020B0702040204020203" pitchFamily="34" charset="0"/>
-              <a:cs typeface="Segoe UI Semibold" panose="020B0702040204020203" pitchFamily="34" charset="0"/>
-            </a:endParaRPr>
           </a:p>
         </p:txBody>
       </p:sp>
@@ -7075,6 +7163,86 @@
           </a:fontRef>
         </p:style>
       </p:cxnSp>
+      <p:sp>
+        <p:nvSpPr>
+          <p:cNvPr id="3" name="Textfeld 2">
+            <a:extLst>
+              <a:ext uri="{FF2B5EF4-FFF2-40B4-BE49-F238E27FC236}">
+                <a16:creationId xmlns:a16="http://schemas.microsoft.com/office/drawing/2014/main" id="{29224935-DB1E-F7A4-0F8D-95A9B86DF830}"/>
+              </a:ext>
+            </a:extLst>
+          </p:cNvPr>
+          <p:cNvSpPr txBox="1"/>
+          <p:nvPr/>
+        </p:nvSpPr>
+        <p:spPr>
+          <a:xfrm>
+            <a:off x="8149427" y="6412078"/>
+            <a:ext cx="3578674" cy="369332"/>
+          </a:xfrm>
+          <a:prstGeom prst="rect">
+            <a:avLst/>
+          </a:prstGeom>
+          <a:noFill/>
+        </p:spPr>
+        <p:txBody>
+          <a:bodyPr wrap="square" rtlCol="0">
+            <a:spAutoFit/>
+          </a:bodyPr>
+          <a:lstStyle/>
+          <a:p>
+            <a:r>
+              <a:rPr lang="de-DE" sz="900" dirty="0" err="1">
+                <a:solidFill>
+                  <a:schemeClr val="bg1"/>
+                </a:solidFill>
+                <a:latin typeface="Segoe UI Semilight" panose="020B0402040204020203" pitchFamily="34" charset="0"/>
+                <a:cs typeface="Segoe UI Semilight" panose="020B0402040204020203" pitchFamily="34" charset="0"/>
+              </a:rPr>
+              <a:t>Created</a:t>
+            </a:r>
+            <a:r>
+              <a:rPr lang="de-DE" sz="900" dirty="0">
+                <a:solidFill>
+                  <a:schemeClr val="bg1"/>
+                </a:solidFill>
+                <a:latin typeface="Segoe UI Semilight" panose="020B0402040204020203" pitchFamily="34" charset="0"/>
+                <a:cs typeface="Segoe UI Semilight" panose="020B0402040204020203" pitchFamily="34" charset="0"/>
+              </a:rPr>
+              <a:t> </a:t>
+            </a:r>
+            <a:r>
+              <a:rPr lang="de-DE" sz="900" dirty="0" err="1">
+                <a:solidFill>
+                  <a:schemeClr val="bg1"/>
+                </a:solidFill>
+                <a:latin typeface="Segoe UI Semilight" panose="020B0402040204020203" pitchFamily="34" charset="0"/>
+                <a:cs typeface="Segoe UI Semilight" panose="020B0402040204020203" pitchFamily="34" charset="0"/>
+              </a:rPr>
+              <a:t>by</a:t>
+            </a:r>
+            <a:r>
+              <a:rPr lang="de-DE" sz="900" dirty="0">
+                <a:solidFill>
+                  <a:schemeClr val="bg1"/>
+                </a:solidFill>
+                <a:latin typeface="Segoe UI Semilight" panose="020B0402040204020203" pitchFamily="34" charset="0"/>
+                <a:cs typeface="Segoe UI Semilight" panose="020B0402040204020203" pitchFamily="34" charset="0"/>
+              </a:rPr>
+              <a:t>: Patrick Paubandt – neue Fische Data Analytics Bootcamp</a:t>
+            </a:r>
+          </a:p>
+          <a:p>
+            <a:endParaRPr lang="de-DE" sz="900" dirty="0">
+              <a:solidFill>
+                <a:schemeClr val="bg1"/>
+              </a:solidFill>
+              <a:latin typeface="Segoe UI Semilight" panose="020B0402040204020203" pitchFamily="34" charset="0"/>
+              <a:cs typeface="Segoe UI Semilight" panose="020B0402040204020203" pitchFamily="34" charset="0"/>
+            </a:endParaRPr>
+          </a:p>
+        </p:txBody>
+      </p:sp>
     </p:spTree>
     <p:extLst>
       <p:ext uri="{BB962C8B-B14F-4D97-AF65-F5344CB8AC3E}">
@@ -15956,6 +16124,570 @@
 </p:sld>
 </file>
 
+<file path=ppt/slides/slide9.xml><?xml version="1.0" encoding="utf-8"?>
+<p:sld xmlns:a="http://schemas.openxmlformats.org/drawingml/2006/main" xmlns:r="http://schemas.openxmlformats.org/officeDocument/2006/relationships" xmlns:p="http://schemas.openxmlformats.org/presentationml/2006/main" showMasterSp="0">
+  <p:cSld>
+    <p:bg>
+      <p:bgPr>
+        <a:solidFill>
+          <a:srgbClr val="16253D"/>
+        </a:solidFill>
+        <a:effectLst/>
+      </p:bgPr>
+    </p:bg>
+    <p:spTree>
+      <p:nvGrpSpPr>
+        <p:cNvPr id="1" name=""/>
+        <p:cNvGrpSpPr/>
+        <p:nvPr/>
+      </p:nvGrpSpPr>
+      <p:grpSpPr>
+        <a:xfrm>
+          <a:off x="0" y="0"/>
+          <a:ext cx="0" cy="0"/>
+          <a:chOff x="0" y="0"/>
+          <a:chExt cx="0" cy="0"/>
+        </a:xfrm>
+      </p:grpSpPr>
+      <p:sp>
+        <p:nvSpPr>
+          <p:cNvPr id="2" name="Titel 1">
+            <a:extLst>
+              <a:ext uri="{FF2B5EF4-FFF2-40B4-BE49-F238E27FC236}">
+                <a16:creationId xmlns:a16="http://schemas.microsoft.com/office/drawing/2014/main" id="{75454C9E-20FB-B999-9303-C71D1334BAD7}"/>
+              </a:ext>
+            </a:extLst>
+          </p:cNvPr>
+          <p:cNvSpPr>
+            <a:spLocks noGrp="1"/>
+          </p:cNvSpPr>
+          <p:nvPr>
+            <p:ph type="title"/>
+          </p:nvPr>
+        </p:nvSpPr>
+        <p:spPr>
+          <a:xfrm>
+            <a:off x="1353827" y="3508311"/>
+            <a:ext cx="9923770" cy="1438762"/>
+          </a:xfrm>
+        </p:spPr>
+        <p:txBody>
+          <a:bodyPr rtlCol="0" anchor="b">
+            <a:normAutofit/>
+          </a:bodyPr>
+          <a:lstStyle>
+            <a:defPPr>
+              <a:defRPr lang="de-DE"/>
+            </a:defPPr>
+          </a:lstStyle>
+          <a:p>
+            <a:pPr rtl="0"/>
+            <a:r>
+              <a:rPr lang="de-DE" dirty="0" err="1">
+                <a:solidFill>
+                  <a:schemeClr val="bg1"/>
+                </a:solidFill>
+                <a:latin typeface="Segoe UI Semibold" panose="020B0702040204020203" pitchFamily="34" charset="0"/>
+                <a:cs typeface="Segoe UI Semibold" panose="020B0702040204020203" pitchFamily="34" charset="0"/>
+              </a:rPr>
+              <a:t>Thank</a:t>
+            </a:r>
+            <a:r>
+              <a:rPr lang="de-DE" dirty="0">
+                <a:solidFill>
+                  <a:schemeClr val="bg1"/>
+                </a:solidFill>
+                <a:latin typeface="Segoe UI Semibold" panose="020B0702040204020203" pitchFamily="34" charset="0"/>
+                <a:cs typeface="Segoe UI Semibold" panose="020B0702040204020203" pitchFamily="34" charset="0"/>
+              </a:rPr>
+              <a:t> </a:t>
+            </a:r>
+            <a:r>
+              <a:rPr lang="de-DE" dirty="0" err="1">
+                <a:solidFill>
+                  <a:schemeClr val="bg1"/>
+                </a:solidFill>
+                <a:latin typeface="Segoe UI Semibold" panose="020B0702040204020203" pitchFamily="34" charset="0"/>
+                <a:cs typeface="Segoe UI Semibold" panose="020B0702040204020203" pitchFamily="34" charset="0"/>
+              </a:rPr>
+              <a:t>you</a:t>
+            </a:r>
+            <a:r>
+              <a:rPr lang="de-DE" dirty="0">
+                <a:solidFill>
+                  <a:schemeClr val="bg1"/>
+                </a:solidFill>
+                <a:latin typeface="Segoe UI Semibold" panose="020B0702040204020203" pitchFamily="34" charset="0"/>
+                <a:cs typeface="Segoe UI Semibold" panose="020B0702040204020203" pitchFamily="34" charset="0"/>
+              </a:rPr>
+              <a:t> </a:t>
+            </a:r>
+            <a:r>
+              <a:rPr lang="de-DE" dirty="0" err="1">
+                <a:solidFill>
+                  <a:schemeClr val="bg1"/>
+                </a:solidFill>
+                <a:latin typeface="Segoe UI Semibold" panose="020B0702040204020203" pitchFamily="34" charset="0"/>
+                <a:cs typeface="Segoe UI Semibold" panose="020B0702040204020203" pitchFamily="34" charset="0"/>
+              </a:rPr>
+              <a:t>for</a:t>
+            </a:r>
+            <a:r>
+              <a:rPr lang="de-DE" dirty="0">
+                <a:solidFill>
+                  <a:schemeClr val="bg1"/>
+                </a:solidFill>
+                <a:latin typeface="Segoe UI Semibold" panose="020B0702040204020203" pitchFamily="34" charset="0"/>
+                <a:cs typeface="Segoe UI Semibold" panose="020B0702040204020203" pitchFamily="34" charset="0"/>
+              </a:rPr>
+              <a:t> </a:t>
+            </a:r>
+            <a:r>
+              <a:rPr lang="de-DE" dirty="0" err="1">
+                <a:solidFill>
+                  <a:schemeClr val="bg1"/>
+                </a:solidFill>
+                <a:latin typeface="Segoe UI Semibold" panose="020B0702040204020203" pitchFamily="34" charset="0"/>
+                <a:cs typeface="Segoe UI Semibold" panose="020B0702040204020203" pitchFamily="34" charset="0"/>
+              </a:rPr>
+              <a:t>your</a:t>
+            </a:r>
+            <a:r>
+              <a:rPr lang="de-DE" dirty="0">
+                <a:solidFill>
+                  <a:schemeClr val="bg1"/>
+                </a:solidFill>
+                <a:latin typeface="Segoe UI Semibold" panose="020B0702040204020203" pitchFamily="34" charset="0"/>
+                <a:cs typeface="Segoe UI Semibold" panose="020B0702040204020203" pitchFamily="34" charset="0"/>
+              </a:rPr>
+              <a:t> </a:t>
+            </a:r>
+            <a:r>
+              <a:rPr lang="de-DE" dirty="0" err="1">
+                <a:solidFill>
+                  <a:schemeClr val="bg1"/>
+                </a:solidFill>
+                <a:latin typeface="Segoe UI Semibold" panose="020B0702040204020203" pitchFamily="34" charset="0"/>
+                <a:cs typeface="Segoe UI Semibold" panose="020B0702040204020203" pitchFamily="34" charset="0"/>
+              </a:rPr>
+              <a:t>attention</a:t>
+            </a:r>
+            <a:r>
+              <a:rPr lang="de-DE" dirty="0">
+                <a:solidFill>
+                  <a:schemeClr val="bg1"/>
+                </a:solidFill>
+                <a:latin typeface="Segoe UI Semibold" panose="020B0702040204020203" pitchFamily="34" charset="0"/>
+                <a:cs typeface="Segoe UI Semibold" panose="020B0702040204020203" pitchFamily="34" charset="0"/>
+              </a:rPr>
+              <a:t>!</a:t>
+            </a:r>
+          </a:p>
+        </p:txBody>
+      </p:sp>
+      <p:sp>
+        <p:nvSpPr>
+          <p:cNvPr id="12" name="Text Placeholder 3">
+            <a:extLst>
+              <a:ext uri="{FF2B5EF4-FFF2-40B4-BE49-F238E27FC236}">
+                <a16:creationId xmlns:a16="http://schemas.microsoft.com/office/drawing/2014/main" id="{9D36B95E-AC92-19B9-4FFE-B2AFB6B94FDD}"/>
+              </a:ext>
+            </a:extLst>
+          </p:cNvPr>
+          <p:cNvSpPr>
+            <a:spLocks noGrp="1"/>
+          </p:cNvSpPr>
+          <p:nvPr>
+            <p:ph type="body" sz="quarter" idx="12"/>
+          </p:nvPr>
+        </p:nvSpPr>
+        <p:spPr>
+          <a:xfrm>
+            <a:off x="1353828" y="5228488"/>
+            <a:ext cx="9923770" cy="1552922"/>
+          </a:xfrm>
+        </p:spPr>
+        <p:txBody>
+          <a:bodyPr>
+            <a:normAutofit/>
+          </a:bodyPr>
+          <a:lstStyle/>
+          <a:p>
+            <a:pPr>
+              <a:lnSpc>
+                <a:spcPct val="150000"/>
+              </a:lnSpc>
+            </a:pPr>
+            <a:r>
+              <a:rPr lang="en-US" sz="1000" b="1" dirty="0">
+                <a:solidFill>
+                  <a:schemeClr val="bg1"/>
+                </a:solidFill>
+                <a:latin typeface="Segoe UI Semilight" panose="020B0402040204020203" pitchFamily="34" charset="0"/>
+                <a:cs typeface="Segoe UI Semilight" panose="020B0402040204020203" pitchFamily="34" charset="0"/>
+              </a:rPr>
+              <a:t>Capstone </a:t>
+            </a:r>
+            <a:r>
+              <a:rPr lang="en-US" sz="1000" b="1" dirty="0" err="1">
+                <a:solidFill>
+                  <a:schemeClr val="bg1"/>
+                </a:solidFill>
+                <a:latin typeface="Segoe UI Semilight" panose="020B0402040204020203" pitchFamily="34" charset="0"/>
+                <a:cs typeface="Segoe UI Semilight" panose="020B0402040204020203" pitchFamily="34" charset="0"/>
+              </a:rPr>
+              <a:t>Projekt</a:t>
+            </a:r>
+            <a:r>
+              <a:rPr lang="en-US" sz="1000" b="1" dirty="0">
+                <a:solidFill>
+                  <a:schemeClr val="bg1"/>
+                </a:solidFill>
+                <a:latin typeface="Segoe UI Semilight" panose="020B0402040204020203" pitchFamily="34" charset="0"/>
+                <a:cs typeface="Segoe UI Semilight" panose="020B0402040204020203" pitchFamily="34" charset="0"/>
+              </a:rPr>
+              <a:t>: NYC Yellow Taxi Tipping -- How does trip-size and friction affect tipping behavior in NYC yellow taxis?</a:t>
+            </a:r>
+          </a:p>
+          <a:p>
+            <a:pPr>
+              <a:lnSpc>
+                <a:spcPct val="150000"/>
+              </a:lnSpc>
+            </a:pPr>
+            <a:r>
+              <a:rPr lang="en-US" sz="1000" b="1" dirty="0">
+                <a:solidFill>
+                  <a:schemeClr val="bg1"/>
+                </a:solidFill>
+                <a:latin typeface="Segoe UI Semilight" panose="020B0402040204020203" pitchFamily="34" charset="0"/>
+                <a:cs typeface="Segoe UI Semilight" panose="020B0402040204020203" pitchFamily="34" charset="0"/>
+              </a:rPr>
+              <a:t>Creator: Patrick Paubandt</a:t>
+            </a:r>
+          </a:p>
+          <a:p>
+            <a:pPr>
+              <a:lnSpc>
+                <a:spcPct val="150000"/>
+              </a:lnSpc>
+            </a:pPr>
+            <a:r>
+              <a:rPr lang="en-US" sz="1000" b="1" dirty="0">
+                <a:solidFill>
+                  <a:schemeClr val="bg1"/>
+                </a:solidFill>
+                <a:latin typeface="Segoe UI Semilight" panose="020B0402040204020203" pitchFamily="34" charset="0"/>
+                <a:cs typeface="Segoe UI Semilight" panose="020B0402040204020203" pitchFamily="34" charset="0"/>
+              </a:rPr>
+              <a:t>Institution: </a:t>
+            </a:r>
+            <a:r>
+              <a:rPr lang="en-US" sz="1000" b="1" dirty="0">
+                <a:solidFill>
+                  <a:schemeClr val="bg1"/>
+                </a:solidFill>
+                <a:latin typeface="Segoe UI Semilight" panose="020B0402040204020203" pitchFamily="34" charset="0"/>
+                <a:cs typeface="Segoe UI Semilight" panose="020B0402040204020203" pitchFamily="34" charset="0"/>
+                <a:hlinkClick r:id="rId3"/>
+              </a:rPr>
+              <a:t>Neue </a:t>
+            </a:r>
+            <a:r>
+              <a:rPr lang="en-US" sz="1000" b="1" dirty="0" err="1">
+                <a:solidFill>
+                  <a:schemeClr val="bg1"/>
+                </a:solidFill>
+                <a:latin typeface="Segoe UI Semilight" panose="020B0402040204020203" pitchFamily="34" charset="0"/>
+                <a:cs typeface="Segoe UI Semilight" panose="020B0402040204020203" pitchFamily="34" charset="0"/>
+                <a:hlinkClick r:id="rId3"/>
+              </a:rPr>
+              <a:t>Fische</a:t>
+            </a:r>
+            <a:r>
+              <a:rPr lang="en-US" sz="1000" b="1" dirty="0">
+                <a:solidFill>
+                  <a:schemeClr val="bg1"/>
+                </a:solidFill>
+                <a:latin typeface="Segoe UI Semilight" panose="020B0402040204020203" pitchFamily="34" charset="0"/>
+                <a:cs typeface="Segoe UI Semilight" panose="020B0402040204020203" pitchFamily="34" charset="0"/>
+                <a:hlinkClick r:id="rId3"/>
+              </a:rPr>
+              <a:t> / Spiced Academy</a:t>
+            </a:r>
+            <a:endParaRPr lang="en-US" sz="1000" b="1" dirty="0">
+              <a:solidFill>
+                <a:schemeClr val="bg1"/>
+              </a:solidFill>
+              <a:latin typeface="Segoe UI Semilight" panose="020B0402040204020203" pitchFamily="34" charset="0"/>
+              <a:cs typeface="Segoe UI Semilight" panose="020B0402040204020203" pitchFamily="34" charset="0"/>
+            </a:endParaRPr>
+          </a:p>
+          <a:p>
+            <a:pPr>
+              <a:lnSpc>
+                <a:spcPct val="150000"/>
+              </a:lnSpc>
+            </a:pPr>
+            <a:r>
+              <a:rPr lang="en-US" sz="1000" b="1" dirty="0">
+                <a:solidFill>
+                  <a:schemeClr val="bg1"/>
+                </a:solidFill>
+                <a:latin typeface="Segoe UI Semilight" panose="020B0402040204020203" pitchFamily="34" charset="0"/>
+                <a:cs typeface="Segoe UI Semilight" panose="020B0402040204020203" pitchFamily="34" charset="0"/>
+              </a:rPr>
+              <a:t>GitHub repository: </a:t>
+            </a:r>
+            <a:r>
+              <a:rPr lang="en-US" sz="1000" b="1" dirty="0">
+                <a:solidFill>
+                  <a:schemeClr val="bg1"/>
+                </a:solidFill>
+                <a:latin typeface="Segoe UI Semilight" panose="020B0402040204020203" pitchFamily="34" charset="0"/>
+                <a:cs typeface="Segoe UI Semilight" panose="020B0402040204020203" pitchFamily="34" charset="0"/>
+                <a:hlinkClick r:id="rId4"/>
+              </a:rPr>
+              <a:t>https://github.com/PatrickPaubandt/Capstone-project-NYCTaxi</a:t>
+            </a:r>
+            <a:endParaRPr lang="en-US" sz="1000" b="1" dirty="0">
+              <a:solidFill>
+                <a:schemeClr val="bg1"/>
+              </a:solidFill>
+              <a:latin typeface="Segoe UI Semilight" panose="020B0402040204020203" pitchFamily="34" charset="0"/>
+              <a:cs typeface="Segoe UI Semilight" panose="020B0402040204020203" pitchFamily="34" charset="0"/>
+            </a:endParaRPr>
+          </a:p>
+          <a:p>
+            <a:pPr>
+              <a:lnSpc>
+                <a:spcPct val="150000"/>
+              </a:lnSpc>
+            </a:pPr>
+            <a:r>
+              <a:rPr lang="en-US" sz="1000" b="1" dirty="0">
+                <a:solidFill>
+                  <a:schemeClr val="bg1"/>
+                </a:solidFill>
+                <a:latin typeface="Segoe UI Semilight" panose="020B0402040204020203" pitchFamily="34" charset="0"/>
+                <a:cs typeface="Segoe UI Semilight" panose="020B0402040204020203" pitchFamily="34" charset="0"/>
+              </a:rPr>
+              <a:t>Data Sources: </a:t>
+            </a:r>
+            <a:r>
+              <a:rPr lang="en-US" sz="1000" b="1" dirty="0">
+                <a:solidFill>
+                  <a:schemeClr val="bg1"/>
+                </a:solidFill>
+                <a:latin typeface="Segoe UI Semilight" panose="020B0402040204020203" pitchFamily="34" charset="0"/>
+                <a:cs typeface="Segoe UI Semilight" panose="020B0402040204020203" pitchFamily="34" charset="0"/>
+                <a:hlinkClick r:id="rId5"/>
+              </a:rPr>
+              <a:t>New York Yellow Taxi Trip Data</a:t>
+            </a:r>
+            <a:r>
+              <a:rPr lang="en-US" sz="1000" b="1" dirty="0">
+                <a:solidFill>
+                  <a:schemeClr val="bg1"/>
+                </a:solidFill>
+                <a:latin typeface="Segoe UI Semilight" panose="020B0402040204020203" pitchFamily="34" charset="0"/>
+                <a:cs typeface="Segoe UI Semilight" panose="020B0402040204020203" pitchFamily="34" charset="0"/>
+              </a:rPr>
+              <a:t> | </a:t>
+            </a:r>
+            <a:r>
+              <a:rPr lang="en-US" sz="1000" b="1" dirty="0">
+                <a:solidFill>
+                  <a:schemeClr val="bg1"/>
+                </a:solidFill>
+                <a:latin typeface="Segoe UI Semilight" panose="020B0402040204020203" pitchFamily="34" charset="0"/>
+                <a:cs typeface="Segoe UI Semilight" panose="020B0402040204020203" pitchFamily="34" charset="0"/>
+                <a:hlinkClick r:id="rId6"/>
+              </a:rPr>
+              <a:t>Taxi Zone Lookup Table</a:t>
+            </a:r>
+            <a:r>
+              <a:rPr lang="en-US" sz="1000" b="1" dirty="0">
+                <a:solidFill>
+                  <a:schemeClr val="bg1"/>
+                </a:solidFill>
+                <a:latin typeface="Segoe UI Semilight" panose="020B0402040204020203" pitchFamily="34" charset="0"/>
+                <a:cs typeface="Segoe UI Semilight" panose="020B0402040204020203" pitchFamily="34" charset="0"/>
+              </a:rPr>
+              <a:t> | </a:t>
+            </a:r>
+            <a:r>
+              <a:rPr lang="en-US" sz="1000" b="1" dirty="0">
+                <a:solidFill>
+                  <a:schemeClr val="bg1"/>
+                </a:solidFill>
+                <a:latin typeface="Segoe UI Semilight" panose="020B0402040204020203" pitchFamily="34" charset="0"/>
+                <a:cs typeface="Segoe UI Semilight" panose="020B0402040204020203" pitchFamily="34" charset="0"/>
+                <a:hlinkClick r:id="rId7"/>
+              </a:rPr>
+              <a:t>BID Data</a:t>
+            </a:r>
+            <a:endParaRPr lang="en-US" sz="1000" b="1" dirty="0">
+              <a:solidFill>
+                <a:schemeClr val="bg1"/>
+              </a:solidFill>
+              <a:latin typeface="Segoe UI Semilight" panose="020B0402040204020203" pitchFamily="34" charset="0"/>
+              <a:cs typeface="Segoe UI Semilight" panose="020B0402040204020203" pitchFamily="34" charset="0"/>
+            </a:endParaRPr>
+          </a:p>
+          <a:p>
+            <a:pPr>
+              <a:lnSpc>
+                <a:spcPct val="150000"/>
+              </a:lnSpc>
+            </a:pPr>
+            <a:r>
+              <a:rPr lang="en-US" sz="1000" b="1" dirty="0">
+                <a:solidFill>
+                  <a:schemeClr val="bg1"/>
+                </a:solidFill>
+                <a:latin typeface="Segoe UI Semilight" panose="020B0402040204020203" pitchFamily="34" charset="0"/>
+                <a:cs typeface="Segoe UI Semilight" panose="020B0402040204020203" pitchFamily="34" charset="0"/>
+              </a:rPr>
+              <a:t>Pictures: </a:t>
+            </a:r>
+          </a:p>
+        </p:txBody>
+      </p:sp>
+      <p:pic>
+        <p:nvPicPr>
+          <p:cNvPr id="10" name="Bildplatzhalter 9" descr="Ein Bild, das Gebäude, draußen, Fahrzeug, Landfahrzeug enthält.&#10;&#10;KI-generierte Inhalte können fehlerhaft sein.">
+            <a:extLst>
+              <a:ext uri="{FF2B5EF4-FFF2-40B4-BE49-F238E27FC236}">
+                <a16:creationId xmlns:a16="http://schemas.microsoft.com/office/drawing/2014/main" id="{19757D61-979A-5EAD-0683-288340BB0B81}"/>
+              </a:ext>
+            </a:extLst>
+          </p:cNvPr>
+          <p:cNvPicPr>
+            <a:picLocks noGrp="1" noChangeAspect="1"/>
+          </p:cNvPicPr>
+          <p:nvPr>
+            <p:ph type="pic" sz="quarter" idx="13"/>
+          </p:nvPr>
+        </p:nvPicPr>
+        <p:blipFill>
+          <a:blip r:embed="rId8"/>
+          <a:srcRect l="-388" t="49618" r="388" b="670"/>
+          <a:stretch/>
+        </p:blipFill>
+        <p:spPr>
+          <a:xfrm>
+            <a:off x="784972" y="-391886"/>
+            <a:ext cx="10361995" cy="3429000"/>
+          </a:xfrm>
+        </p:spPr>
+      </p:pic>
+      <p:sp>
+        <p:nvSpPr>
+          <p:cNvPr id="13" name="Rechteck 12">
+            <a:extLst>
+              <a:ext uri="{FF2B5EF4-FFF2-40B4-BE49-F238E27FC236}">
+                <a16:creationId xmlns:a16="http://schemas.microsoft.com/office/drawing/2014/main" id="{5381A484-327A-29AF-6A2B-E20B4DD5041C}"/>
+              </a:ext>
+            </a:extLst>
+          </p:cNvPr>
+          <p:cNvSpPr/>
+          <p:nvPr/>
+        </p:nvSpPr>
+        <p:spPr>
+          <a:xfrm>
+            <a:off x="11264202" y="0"/>
+            <a:ext cx="927798" cy="924448"/>
+          </a:xfrm>
+          <a:prstGeom prst="rect">
+            <a:avLst/>
+          </a:prstGeom>
+          <a:solidFill>
+            <a:srgbClr val="EFB509"/>
+          </a:solidFill>
+          <a:ln>
+            <a:noFill/>
+          </a:ln>
+        </p:spPr>
+        <p:style>
+          <a:lnRef idx="2">
+            <a:schemeClr val="accent1">
+              <a:shade val="15000"/>
+            </a:schemeClr>
+          </a:lnRef>
+          <a:fillRef idx="1">
+            <a:schemeClr val="accent1"/>
+          </a:fillRef>
+          <a:effectRef idx="0">
+            <a:schemeClr val="accent1"/>
+          </a:effectRef>
+          <a:fontRef idx="minor">
+            <a:schemeClr val="lt1"/>
+          </a:fontRef>
+        </p:style>
+        <p:txBody>
+          <a:bodyPr rtlCol="0" anchor="ctr"/>
+          <a:lstStyle/>
+          <a:p>
+            <a:pPr algn="ctr"/>
+            <a:endParaRPr lang="de-DE"/>
+          </a:p>
+        </p:txBody>
+      </p:sp>
+      <p:cxnSp>
+        <p:nvCxnSpPr>
+          <p:cNvPr id="14" name="Gerader Verbinder 13">
+            <a:extLst>
+              <a:ext uri="{FF2B5EF4-FFF2-40B4-BE49-F238E27FC236}">
+                <a16:creationId xmlns:a16="http://schemas.microsoft.com/office/drawing/2014/main" id="{6524A8A9-E2F5-A543-B68D-909180632958}"/>
+              </a:ext>
+            </a:extLst>
+          </p:cNvPr>
+          <p:cNvCxnSpPr/>
+          <p:nvPr/>
+        </p:nvCxnSpPr>
+        <p:spPr>
+          <a:xfrm>
+            <a:off x="804028" y="0"/>
+            <a:ext cx="0" cy="5943601"/>
+          </a:xfrm>
+          <a:prstGeom prst="line">
+            <a:avLst/>
+          </a:prstGeom>
+          <a:ln w="15875">
+            <a:solidFill>
+              <a:srgbClr val="EFB509"/>
+            </a:solidFill>
+          </a:ln>
+        </p:spPr>
+        <p:style>
+          <a:lnRef idx="1">
+            <a:schemeClr val="accent1"/>
+          </a:lnRef>
+          <a:fillRef idx="0">
+            <a:schemeClr val="accent1"/>
+          </a:fillRef>
+          <a:effectRef idx="0">
+            <a:schemeClr val="accent1"/>
+          </a:effectRef>
+          <a:fontRef idx="minor">
+            <a:schemeClr val="tx1"/>
+          </a:fontRef>
+        </p:style>
+      </p:cxnSp>
+    </p:spTree>
+    <p:extLst>
+      <p:ext uri="{BB962C8B-B14F-4D97-AF65-F5344CB8AC3E}">
+        <p14:creationId xmlns:p14="http://schemas.microsoft.com/office/powerpoint/2010/main" val="3642157546"/>
+      </p:ext>
+    </p:extLst>
+  </p:cSld>
+  <p:clrMapOvr>
+    <a:masterClrMapping/>
+  </p:clrMapOvr>
+</p:sld>
+</file>
+
 <file path=ppt/theme/theme1.xml><?xml version="1.0" encoding="utf-8"?>
 <a:theme xmlns:a="http://schemas.openxmlformats.org/drawingml/2006/main" name="Benutzerdefiniert">
   <a:themeElements>
@@ -16777,15 +17509,6 @@
 </file>
 
 <file path=customXml/item1.xml><?xml version="1.0" encoding="utf-8"?>
-<?mso-contentType ?>
-<FormTemplates xmlns="http://schemas.microsoft.com/sharepoint/v3/contenttype/forms">
-  <Display>DocumentLibraryForm</Display>
-  <Edit>DocumentLibraryForm</Edit>
-  <New>DocumentLibraryForm</New>
-</FormTemplates>
-</file>
-
-<file path=customXml/item2.xml><?xml version="1.0" encoding="utf-8"?>
 <p:properties xmlns:p="http://schemas.microsoft.com/office/2006/metadata/properties" xmlns:xsi="http://www.w3.org/2001/XMLSchema-instance" xmlns:pc="http://schemas.microsoft.com/office/infopath/2007/PartnerControls">
   <documentManagement>
     <_ip_UnifiedCompliancePolicyUIAction xmlns="http://schemas.microsoft.com/sharepoint/v3" xsi:nil="true"/>
@@ -16803,6 +17526,15 @@
     <MediaServiceKeyPoints xmlns="71af3243-3dd4-4a8d-8c0d-dd76da1f02a5" xsi:nil="true"/>
   </documentManagement>
 </p:properties>
+</file>
+
+<file path=customXml/item2.xml><?xml version="1.0" encoding="utf-8"?>
+<?mso-contentType ?>
+<FormTemplates xmlns="http://schemas.microsoft.com/sharepoint/v3/contenttype/forms">
+  <Display>DocumentLibraryForm</Display>
+  <Edit>DocumentLibraryForm</Edit>
+  <New>DocumentLibraryForm</New>
+</FormTemplates>
 </file>
 
 <file path=customXml/item3.xml><?xml version="1.0" encoding="utf-8"?>
@@ -17118,14 +17850,6 @@
 </file>
 
 <file path=customXml/itemProps1.xml><?xml version="1.0" encoding="utf-8"?>
-<ds:datastoreItem xmlns:ds="http://schemas.openxmlformats.org/officeDocument/2006/customXml" ds:itemID="{6DE3707C-8CAB-4302-B7E1-D32E1543E05C}">
-  <ds:schemaRefs>
-    <ds:schemaRef ds:uri="http://schemas.microsoft.com/sharepoint/v3/contenttype/forms"/>
-  </ds:schemaRefs>
-</ds:datastoreItem>
-</file>
-
-<file path=customXml/itemProps2.xml><?xml version="1.0" encoding="utf-8"?>
 <ds:datastoreItem xmlns:ds="http://schemas.openxmlformats.org/officeDocument/2006/customXml" ds:itemID="{3FDB7358-0BCB-4DEB-B717-C1D7CC555F05}">
   <ds:schemaRefs>
     <ds:schemaRef ds:uri="http://schemas.microsoft.com/office/2006/metadata/properties"/>
@@ -17133,6 +17857,14 @@
     <ds:schemaRef ds:uri="http://schemas.microsoft.com/sharepoint/v3"/>
     <ds:schemaRef ds:uri="71af3243-3dd4-4a8d-8c0d-dd76da1f02a5"/>
     <ds:schemaRef ds:uri="230e9df3-be65-4c73-a93b-d1236ebd677e"/>
+  </ds:schemaRefs>
+</ds:datastoreItem>
+</file>
+
+<file path=customXml/itemProps2.xml><?xml version="1.0" encoding="utf-8"?>
+<ds:datastoreItem xmlns:ds="http://schemas.openxmlformats.org/officeDocument/2006/customXml" ds:itemID="{6DE3707C-8CAB-4302-B7E1-D32E1543E05C}">
+  <ds:schemaRefs>
+    <ds:schemaRef ds:uri="http://schemas.microsoft.com/sharepoint/v3/contenttype/forms"/>
   </ds:schemaRefs>
 </ds:datastoreItem>
 </file>

</xml_diff>